<commit_message>
Fetes modificacions petites en estructura i contingut
</commit_message>
<xml_diff>
--- a/presentació/presentacioTFG.pptx
+++ b/presentació/presentacioTFG.pptx
@@ -21,9 +21,9 @@
     <p:sldId id="263" r:id="rId12"/>
     <p:sldId id="264" r:id="rId13"/>
     <p:sldId id="265" r:id="rId14"/>
-    <p:sldId id="274" r:id="rId15"/>
-    <p:sldId id="276" r:id="rId16"/>
-    <p:sldId id="266" r:id="rId17"/>
+    <p:sldId id="266" r:id="rId15"/>
+    <p:sldId id="274" r:id="rId16"/>
+    <p:sldId id="276" r:id="rId17"/>
     <p:sldId id="267" r:id="rId18"/>
     <p:sldId id="269" r:id="rId19"/>
   </p:sldIdLst>
@@ -11369,6 +11369,81 @@
   <p:clrMapOvr>
     <a:masterClrMapping/>
   </p:clrMapOvr>
+  <p:timing>
+    <p:tnLst>
+      <p:par>
+        <p:cTn id="1" dur="indefinite" restart="never" nodeType="tmRoot">
+          <p:childTnLst>
+            <p:seq concurrent="1" nextAc="seek">
+              <p:cTn id="2" dur="indefinite" nodeType="mainSeq">
+                <p:childTnLst>
+                  <p:par>
+                    <p:cTn id="3" fill="hold">
+                      <p:stCondLst>
+                        <p:cond delay="indefinite"/>
+                      </p:stCondLst>
+                      <p:childTnLst>
+                        <p:par>
+                          <p:cTn id="4" fill="hold">
+                            <p:stCondLst>
+                              <p:cond delay="0"/>
+                            </p:stCondLst>
+                            <p:childTnLst>
+                              <p:par>
+                                <p:cTn id="5" presetID="1" presetClass="entr" presetSubtype="0" fill="hold" nodeType="clickEffect">
+                                  <p:stCondLst>
+                                    <p:cond delay="0"/>
+                                  </p:stCondLst>
+                                  <p:childTnLst>
+                                    <p:set>
+                                      <p:cBhvr>
+                                        <p:cTn id="6" dur="1" fill="hold">
+                                          <p:stCondLst>
+                                            <p:cond delay="0"/>
+                                          </p:stCondLst>
+                                        </p:cTn>
+                                        <p:tgtEl>
+                                          <p:spTgt spid="6"/>
+                                        </p:tgtEl>
+                                        <p:attrNameLst>
+                                          <p:attrName>style.visibility</p:attrName>
+                                        </p:attrNameLst>
+                                      </p:cBhvr>
+                                      <p:to>
+                                        <p:strVal val="visible"/>
+                                      </p:to>
+                                    </p:set>
+                                  </p:childTnLst>
+                                </p:cTn>
+                              </p:par>
+                            </p:childTnLst>
+                          </p:cTn>
+                        </p:par>
+                      </p:childTnLst>
+                    </p:cTn>
+                  </p:par>
+                </p:childTnLst>
+              </p:cTn>
+              <p:prevCondLst>
+                <p:cond evt="onPrev" delay="0">
+                  <p:tgtEl>
+                    <p:sldTgt/>
+                  </p:tgtEl>
+                </p:cond>
+              </p:prevCondLst>
+              <p:nextCondLst>
+                <p:cond evt="onNext" delay="0">
+                  <p:tgtEl>
+                    <p:sldTgt/>
+                  </p:tgtEl>
+                </p:cond>
+              </p:nextCondLst>
+            </p:seq>
+          </p:childTnLst>
+        </p:cTn>
+      </p:par>
+    </p:tnLst>
+  </p:timing>
 </p:sld>
 </file>
 
@@ -11465,8 +11540,8 @@
         </p:nvSpPr>
         <p:spPr>
           <a:xfrm>
-            <a:off x="2491530" y="1543574"/>
-            <a:ext cx="4557237" cy="2862322"/>
+            <a:off x="2273416" y="2550253"/>
+            <a:ext cx="4557237" cy="2246769"/>
           </a:xfrm>
           <a:prstGeom prst="rect">
             <a:avLst/>
@@ -11488,30 +11563,7 @@
                 <a:latin typeface="Arial" panose="020B0604020202020204" pitchFamily="34" charset="0"/>
                 <a:cs typeface="Arial" panose="020B0604020202020204" pitchFamily="34" charset="0"/>
               </a:rPr>
-              <a:t>Defineix una funció f(x) amb una desviació mínima</a:t>
-            </a:r>
-          </a:p>
-          <a:p>
-            <a:pPr marL="285750" indent="-285750">
-              <a:buFont typeface="Arial" panose="020B0604020202020204" pitchFamily="34" charset="0"/>
-              <a:buChar char="•"/>
-            </a:pPr>
-            <a:endParaRPr lang="ca-ES" sz="2000" dirty="0">
-              <a:latin typeface="Arial" panose="020B0604020202020204" pitchFamily="34" charset="0"/>
-              <a:cs typeface="Arial" panose="020B0604020202020204" pitchFamily="34" charset="0"/>
-            </a:endParaRPr>
-          </a:p>
-          <a:p>
-            <a:pPr marL="285750" indent="-285750">
-              <a:buFont typeface="Arial" panose="020B0604020202020204" pitchFamily="34" charset="0"/>
-              <a:buChar char="•"/>
-            </a:pPr>
-            <a:r>
-              <a:rPr lang="ca-ES" sz="2000" dirty="0">
-                <a:latin typeface="Arial" panose="020B0604020202020204" pitchFamily="34" charset="0"/>
-                <a:cs typeface="Arial" panose="020B0604020202020204" pitchFamily="34" charset="0"/>
-              </a:rPr>
-              <a:t>Busca hiperplans amb X dimensions amb distància màxima als punts</a:t>
+              <a:t>Busca hiperplans amb X(entrades) dimensions amb distància màxima als punts</a:t>
             </a:r>
           </a:p>
           <a:p>
@@ -11548,6 +11600,20 @@
                 <a:cs typeface="Arial" panose="020B0604020202020204" pitchFamily="34" charset="0"/>
               </a:rPr>
               <a:t>Kernel</a:t>
+            </a:r>
+            <a:r>
+              <a:rPr lang="ca-ES" sz="2000" b="1" dirty="0">
+                <a:latin typeface="Arial" panose="020B0604020202020204" pitchFamily="34" charset="0"/>
+                <a:cs typeface="Arial" panose="020B0604020202020204" pitchFamily="34" charset="0"/>
+              </a:rPr>
+              <a:t> -&gt; </a:t>
+            </a:r>
+            <a:r>
+              <a:rPr lang="ca-ES" sz="2000" dirty="0">
+                <a:latin typeface="Arial" panose="020B0604020202020204" pitchFamily="34" charset="0"/>
+                <a:cs typeface="Arial" panose="020B0604020202020204" pitchFamily="34" charset="0"/>
+              </a:rPr>
+              <a:t>Com es processen les dades d’entrada</a:t>
             </a:r>
             <a:endParaRPr lang="ca-ES" sz="2000" b="1" dirty="0">
               <a:latin typeface="Arial" panose="020B0604020202020204" pitchFamily="34" charset="0"/>
@@ -11938,6 +12004,94 @@
       </p:sp>
       <p:pic>
         <p:nvPicPr>
+          <p:cNvPr id="6" name="Imagen 5">
+            <a:extLst>
+              <a:ext uri="{FF2B5EF4-FFF2-40B4-BE49-F238E27FC236}">
+                <a16:creationId xmlns:a16="http://schemas.microsoft.com/office/drawing/2014/main" id="{300A74DA-CAD6-44BC-9959-D346C327C055}"/>
+              </a:ext>
+            </a:extLst>
+          </p:cNvPr>
+          <p:cNvPicPr>
+            <a:picLocks noChangeAspect="1"/>
+          </p:cNvPicPr>
+          <p:nvPr/>
+        </p:nvPicPr>
+        <p:blipFill>
+          <a:blip r:embed="rId2"/>
+          <a:stretch>
+            <a:fillRect/>
+          </a:stretch>
+        </p:blipFill>
+        <p:spPr>
+          <a:xfrm>
+            <a:off x="2918894" y="1620978"/>
+            <a:ext cx="6354211" cy="4612912"/>
+          </a:xfrm>
+          <a:prstGeom prst="rect">
+            <a:avLst/>
+          </a:prstGeom>
+        </p:spPr>
+      </p:pic>
+    </p:spTree>
+    <p:extLst>
+      <p:ext uri="{BB962C8B-B14F-4D97-AF65-F5344CB8AC3E}">
+        <p14:creationId xmlns:p14="http://schemas.microsoft.com/office/powerpoint/2010/main" val="1196165088"/>
+      </p:ext>
+    </p:extLst>
+  </p:cSld>
+  <p:clrMapOvr>
+    <a:masterClrMapping/>
+  </p:clrMapOvr>
+</p:sld>
+</file>
+
+<file path=ppt/slides/slide14.xml><?xml version="1.0" encoding="utf-8"?>
+<p:sld xmlns:a="http://schemas.openxmlformats.org/drawingml/2006/main" xmlns:r="http://schemas.openxmlformats.org/officeDocument/2006/relationships" xmlns:p="http://schemas.openxmlformats.org/presentationml/2006/main">
+  <p:cSld>
+    <p:spTree>
+      <p:nvGrpSpPr>
+        <p:cNvPr id="1" name=""/>
+        <p:cNvGrpSpPr/>
+        <p:nvPr/>
+      </p:nvGrpSpPr>
+      <p:grpSpPr>
+        <a:xfrm>
+          <a:off x="0" y="0"/>
+          <a:ext cx="0" cy="0"/>
+          <a:chOff x="0" y="0"/>
+          <a:chExt cx="0" cy="0"/>
+        </a:xfrm>
+      </p:grpSpPr>
+      <p:sp>
+        <p:nvSpPr>
+          <p:cNvPr id="2" name="Título 1">
+            <a:extLst>
+              <a:ext uri="{FF2B5EF4-FFF2-40B4-BE49-F238E27FC236}">
+                <a16:creationId xmlns:a16="http://schemas.microsoft.com/office/drawing/2014/main" id="{EA2573A9-12EE-43E0-9999-81D862996696}"/>
+              </a:ext>
+            </a:extLst>
+          </p:cNvPr>
+          <p:cNvSpPr>
+            <a:spLocks noGrp="1"/>
+          </p:cNvSpPr>
+          <p:nvPr>
+            <p:ph type="title"/>
+          </p:nvPr>
+        </p:nvSpPr>
+        <p:spPr/>
+        <p:txBody>
+          <a:bodyPr/>
+          <a:lstStyle/>
+          <a:p>
+            <a:r>
+              <a:rPr lang="ca-ES" dirty="0"/>
+              <a:t>Anàlisis de resultats</a:t>
+            </a:r>
+          </a:p>
+        </p:txBody>
+      </p:sp>
+      <p:pic>
+        <p:nvPicPr>
           <p:cNvPr id="4" name="Imagen 3">
             <a:extLst>
               <a:ext uri="{FF2B5EF4-FFF2-40B4-BE49-F238E27FC236}">
@@ -12009,7 +12163,7 @@
 </p:sld>
 </file>
 
-<file path=ppt/slides/slide14.xml><?xml version="1.0" encoding="utf-8"?>
+<file path=ppt/slides/slide15.xml><?xml version="1.0" encoding="utf-8"?>
 <p:sld xmlns:a="http://schemas.openxmlformats.org/drawingml/2006/main" xmlns:r="http://schemas.openxmlformats.org/officeDocument/2006/relationships" xmlns:p="http://schemas.openxmlformats.org/presentationml/2006/main">
   <p:cSld>
     <p:spTree>
@@ -12127,124 +12281,6 @@
 </p:sld>
 </file>
 
-<file path=ppt/slides/slide15.xml><?xml version="1.0" encoding="utf-8"?>
-<p:sld xmlns:a="http://schemas.openxmlformats.org/drawingml/2006/main" xmlns:r="http://schemas.openxmlformats.org/officeDocument/2006/relationships" xmlns:p="http://schemas.openxmlformats.org/presentationml/2006/main">
-  <p:cSld>
-    <p:spTree>
-      <p:nvGrpSpPr>
-        <p:cNvPr id="1" name=""/>
-        <p:cNvGrpSpPr/>
-        <p:nvPr/>
-      </p:nvGrpSpPr>
-      <p:grpSpPr>
-        <a:xfrm>
-          <a:off x="0" y="0"/>
-          <a:ext cx="0" cy="0"/>
-          <a:chOff x="0" y="0"/>
-          <a:chExt cx="0" cy="0"/>
-        </a:xfrm>
-      </p:grpSpPr>
-      <p:sp>
-        <p:nvSpPr>
-          <p:cNvPr id="2" name="Título 1">
-            <a:extLst>
-              <a:ext uri="{FF2B5EF4-FFF2-40B4-BE49-F238E27FC236}">
-                <a16:creationId xmlns:a16="http://schemas.microsoft.com/office/drawing/2014/main" id="{EA2573A9-12EE-43E0-9999-81D862996696}"/>
-              </a:ext>
-            </a:extLst>
-          </p:cNvPr>
-          <p:cNvSpPr>
-            <a:spLocks noGrp="1"/>
-          </p:cNvSpPr>
-          <p:nvPr>
-            <p:ph type="title"/>
-          </p:nvPr>
-        </p:nvSpPr>
-        <p:spPr/>
-        <p:txBody>
-          <a:bodyPr/>
-          <a:lstStyle/>
-          <a:p>
-            <a:r>
-              <a:rPr lang="ca-ES" dirty="0"/>
-              <a:t>Anàlisis de resultats</a:t>
-            </a:r>
-          </a:p>
-        </p:txBody>
-      </p:sp>
-      <p:pic>
-        <p:nvPicPr>
-          <p:cNvPr id="6" name="Imagen 5">
-            <a:extLst>
-              <a:ext uri="{FF2B5EF4-FFF2-40B4-BE49-F238E27FC236}">
-                <a16:creationId xmlns:a16="http://schemas.microsoft.com/office/drawing/2014/main" id="{300A74DA-CAD6-44BC-9959-D346C327C055}"/>
-              </a:ext>
-            </a:extLst>
-          </p:cNvPr>
-          <p:cNvPicPr>
-            <a:picLocks noChangeAspect="1"/>
-          </p:cNvPicPr>
-          <p:nvPr/>
-        </p:nvPicPr>
-        <p:blipFill>
-          <a:blip r:embed="rId2"/>
-          <a:stretch>
-            <a:fillRect/>
-          </a:stretch>
-        </p:blipFill>
-        <p:spPr>
-          <a:xfrm>
-            <a:off x="2133047" y="2004970"/>
-            <a:ext cx="4060866" cy="2948032"/>
-          </a:xfrm>
-          <a:prstGeom prst="rect">
-            <a:avLst/>
-          </a:prstGeom>
-        </p:spPr>
-      </p:pic>
-      <p:pic>
-        <p:nvPicPr>
-          <p:cNvPr id="4" name="Imagen 3">
-            <a:extLst>
-              <a:ext uri="{FF2B5EF4-FFF2-40B4-BE49-F238E27FC236}">
-                <a16:creationId xmlns:a16="http://schemas.microsoft.com/office/drawing/2014/main" id="{AFD792DF-D83A-4FA7-90D7-DBC6A7992131}"/>
-              </a:ext>
-            </a:extLst>
-          </p:cNvPr>
-          <p:cNvPicPr>
-            <a:picLocks noChangeAspect="1"/>
-          </p:cNvPicPr>
-          <p:nvPr/>
-        </p:nvPicPr>
-        <p:blipFill>
-          <a:blip r:embed="rId3"/>
-          <a:stretch>
-            <a:fillRect/>
-          </a:stretch>
-        </p:blipFill>
-        <p:spPr>
-          <a:xfrm>
-            <a:off x="6576969" y="1535508"/>
-            <a:ext cx="4424523" cy="3786984"/>
-          </a:xfrm>
-          <a:prstGeom prst="rect">
-            <a:avLst/>
-          </a:prstGeom>
-        </p:spPr>
-      </p:pic>
-    </p:spTree>
-    <p:extLst>
-      <p:ext uri="{BB962C8B-B14F-4D97-AF65-F5344CB8AC3E}">
-        <p14:creationId xmlns:p14="http://schemas.microsoft.com/office/powerpoint/2010/main" val="1196165088"/>
-      </p:ext>
-    </p:extLst>
-  </p:cSld>
-  <p:clrMapOvr>
-    <a:masterClrMapping/>
-  </p:clrMapOvr>
-</p:sld>
-</file>
-
 <file path=ppt/slides/slide16.xml><?xml version="1.0" encoding="utf-8"?>
 <p:sld xmlns:a="http://schemas.openxmlformats.org/drawingml/2006/main" xmlns:r="http://schemas.openxmlformats.org/officeDocument/2006/relationships" xmlns:p="http://schemas.openxmlformats.org/presentationml/2006/main">
   <p:cSld>
@@ -12452,8 +12488,8 @@
         </p:blipFill>
         <p:spPr>
           <a:xfrm>
-            <a:off x="9640007" y="1383129"/>
-            <a:ext cx="914400" cy="914400"/>
+            <a:off x="9602441" y="1655692"/>
+            <a:ext cx="787510" cy="787510"/>
           </a:xfrm>
           <a:prstGeom prst="rect">
             <a:avLst/>
@@ -12462,10 +12498,10 @@
       </p:pic>
       <p:pic>
         <p:nvPicPr>
-          <p:cNvPr id="7" name="Gráfico 6" descr="Marca de verificación">
+          <p:cNvPr id="12" name="Gráfico 11" descr="Marca de verificación">
             <a:extLst>
               <a:ext uri="{FF2B5EF4-FFF2-40B4-BE49-F238E27FC236}">
-                <a16:creationId xmlns:a16="http://schemas.microsoft.com/office/drawing/2014/main" id="{93D1A9AE-B1D9-4675-8F87-1782C45D941B}"/>
+                <a16:creationId xmlns:a16="http://schemas.microsoft.com/office/drawing/2014/main" id="{1E12951F-D676-47DE-9AE7-EEFA9D850C6D}"/>
               </a:ext>
             </a:extLst>
           </p:cNvPr>
@@ -12488,8 +12524,8 @@
         </p:blipFill>
         <p:spPr>
           <a:xfrm>
-            <a:off x="9640007" y="2369362"/>
-            <a:ext cx="914400" cy="914400"/>
+            <a:off x="9490924" y="2683567"/>
+            <a:ext cx="787510" cy="787510"/>
           </a:xfrm>
           <a:prstGeom prst="rect">
             <a:avLst/>
@@ -12498,10 +12534,10 @@
       </p:pic>
       <p:pic>
         <p:nvPicPr>
-          <p:cNvPr id="8" name="Gráfico 7" descr="Marca de verificación">
+          <p:cNvPr id="13" name="Gráfico 12" descr="Marca de verificación">
             <a:extLst>
               <a:ext uri="{FF2B5EF4-FFF2-40B4-BE49-F238E27FC236}">
-                <a16:creationId xmlns:a16="http://schemas.microsoft.com/office/drawing/2014/main" id="{FA919BDA-0CD7-4FED-A492-A57380FFAF95}"/>
+                <a16:creationId xmlns:a16="http://schemas.microsoft.com/office/drawing/2014/main" id="{84812B76-BC39-48DF-93AF-124B4E1AD1C5}"/>
               </a:ext>
             </a:extLst>
           </p:cNvPr>
@@ -12524,8 +12560,8 @@
         </p:blipFill>
         <p:spPr>
           <a:xfrm>
-            <a:off x="8369417" y="3382679"/>
-            <a:ext cx="914400" cy="914400"/>
+            <a:off x="8477237" y="3446124"/>
+            <a:ext cx="787510" cy="787510"/>
           </a:xfrm>
           <a:prstGeom prst="rect">
             <a:avLst/>
@@ -12534,10 +12570,10 @@
       </p:pic>
       <p:pic>
         <p:nvPicPr>
-          <p:cNvPr id="9" name="Gráfico 8" descr="Marca de verificación">
+          <p:cNvPr id="14" name="Gráfico 13" descr="Marca de verificación">
             <a:extLst>
               <a:ext uri="{FF2B5EF4-FFF2-40B4-BE49-F238E27FC236}">
-                <a16:creationId xmlns:a16="http://schemas.microsoft.com/office/drawing/2014/main" id="{491052D9-219D-4846-B3E6-1DE7179A3F9D}"/>
+                <a16:creationId xmlns:a16="http://schemas.microsoft.com/office/drawing/2014/main" id="{02E14118-1A07-4388-977F-BE9F9F4A20C6}"/>
               </a:ext>
             </a:extLst>
           </p:cNvPr>
@@ -12560,8 +12596,8 @@
         </p:blipFill>
         <p:spPr>
           <a:xfrm>
-            <a:off x="5372735" y="4208015"/>
-            <a:ext cx="744985" cy="744985"/>
+            <a:off x="9602441" y="4844471"/>
+            <a:ext cx="787510" cy="787510"/>
           </a:xfrm>
           <a:prstGeom prst="rect">
             <a:avLst/>
@@ -12570,10 +12606,10 @@
       </p:pic>
       <p:pic>
         <p:nvPicPr>
-          <p:cNvPr id="10" name="Gráfico 9" descr="Marca de verificación">
+          <p:cNvPr id="15" name="Gráfico 14" descr="Marca de verificación">
             <a:extLst>
               <a:ext uri="{FF2B5EF4-FFF2-40B4-BE49-F238E27FC236}">
-                <a16:creationId xmlns:a16="http://schemas.microsoft.com/office/drawing/2014/main" id="{2A9EA987-BFFF-4151-A7B8-789FC85605A4}"/>
+                <a16:creationId xmlns:a16="http://schemas.microsoft.com/office/drawing/2014/main" id="{174F3BE8-CB8A-433F-8C16-78CE06EBD373}"/>
               </a:ext>
             </a:extLst>
           </p:cNvPr>
@@ -12596,8 +12632,8 @@
         </p:blipFill>
         <p:spPr>
           <a:xfrm>
-            <a:off x="9538996" y="4708984"/>
-            <a:ext cx="914400" cy="914400"/>
+            <a:off x="5139643" y="4137964"/>
+            <a:ext cx="787510" cy="787510"/>
           </a:xfrm>
           <a:prstGeom prst="rect">
             <a:avLst/>
@@ -12693,7 +12729,7 @@
                                           </p:stCondLst>
                                         </p:cTn>
                                         <p:tgtEl>
-                                          <p:spTgt spid="7"/>
+                                          <p:spTgt spid="12"/>
                                         </p:tgtEl>
                                         <p:attrNameLst>
                                           <p:attrName>style.visibility</p:attrName>
@@ -12738,7 +12774,7 @@
                                           </p:stCondLst>
                                         </p:cTn>
                                         <p:tgtEl>
-                                          <p:spTgt spid="8"/>
+                                          <p:spTgt spid="13"/>
                                         </p:tgtEl>
                                         <p:attrNameLst>
                                           <p:attrName>style.visibility</p:attrName>
@@ -12783,7 +12819,7 @@
                                           </p:stCondLst>
                                         </p:cTn>
                                         <p:tgtEl>
-                                          <p:spTgt spid="9"/>
+                                          <p:spTgt spid="15"/>
                                         </p:tgtEl>
                                         <p:attrNameLst>
                                           <p:attrName>style.visibility</p:attrName>
@@ -12828,7 +12864,7 @@
                                           </p:stCondLst>
                                         </p:cTn>
                                         <p:tgtEl>
-                                          <p:spTgt spid="10"/>
+                                          <p:spTgt spid="14"/>
                                         </p:tgtEl>
                                         <p:attrNameLst>
                                           <p:attrName>style.visibility</p:attrName>
@@ -12997,8 +13033,8 @@
         </p:nvSpPr>
         <p:spPr>
           <a:xfrm>
-            <a:off x="2005695" y="1536681"/>
-            <a:ext cx="5637402" cy="3416320"/>
+            <a:off x="1879860" y="1868719"/>
+            <a:ext cx="5637402" cy="2308324"/>
           </a:xfrm>
           <a:prstGeom prst="rect">
             <a:avLst/>
@@ -13074,45 +13110,6 @@
                 <a:cs typeface="Arial" panose="020B0604020202020204" pitchFamily="34" charset="0"/>
               </a:rPr>
               <a:t>Efectes catastròfics</a:t>
-            </a:r>
-          </a:p>
-          <a:p>
-            <a:pPr marL="742950" lvl="1" indent="-285750">
-              <a:buFont typeface="Arial" panose="020B0604020202020204" pitchFamily="34" charset="0"/>
-              <a:buChar char="•"/>
-            </a:pPr>
-            <a:r>
-              <a:rPr lang="ca-ES" sz="2400" dirty="0">
-                <a:latin typeface="Arial" panose="020B0604020202020204" pitchFamily="34" charset="0"/>
-                <a:cs typeface="Arial" panose="020B0604020202020204" pitchFamily="34" charset="0"/>
-              </a:rPr>
-              <a:t>Augment del nivell del mar</a:t>
-            </a:r>
-          </a:p>
-          <a:p>
-            <a:pPr marL="742950" lvl="1" indent="-285750">
-              <a:buFont typeface="Arial" panose="020B0604020202020204" pitchFamily="34" charset="0"/>
-              <a:buChar char="•"/>
-            </a:pPr>
-            <a:r>
-              <a:rPr lang="ca-ES" sz="2400" dirty="0">
-                <a:latin typeface="Arial" panose="020B0604020202020204" pitchFamily="34" charset="0"/>
-                <a:cs typeface="Arial" panose="020B0604020202020204" pitchFamily="34" charset="0"/>
-              </a:rPr>
-              <a:t>Desaparició dels pols</a:t>
-            </a:r>
-          </a:p>
-          <a:p>
-            <a:pPr marL="742950" lvl="1" indent="-285750">
-              <a:buFont typeface="Arial" panose="020B0604020202020204" pitchFamily="34" charset="0"/>
-              <a:buChar char="•"/>
-            </a:pPr>
-            <a:r>
-              <a:rPr lang="ca-ES" sz="2400" dirty="0">
-                <a:latin typeface="Arial" panose="020B0604020202020204" pitchFamily="34" charset="0"/>
-                <a:cs typeface="Arial" panose="020B0604020202020204" pitchFamily="34" charset="0"/>
-              </a:rPr>
-              <a:t>Desertització</a:t>
             </a:r>
           </a:p>
         </p:txBody>
@@ -13139,7 +13136,7 @@
         </p:blipFill>
         <p:spPr>
           <a:xfrm>
-            <a:off x="7643097" y="2463799"/>
+            <a:off x="7232036" y="2463798"/>
             <a:ext cx="3556415" cy="2857520"/>
           </a:xfrm>
           <a:prstGeom prst="rect">
@@ -13169,7 +13166,7 @@
         </p:blipFill>
         <p:spPr>
           <a:xfrm>
-            <a:off x="7648261" y="2463799"/>
+            <a:off x="7237200" y="2463799"/>
             <a:ext cx="3551251" cy="2857519"/>
           </a:xfrm>
           <a:prstGeom prst="rect">
@@ -13191,7 +13188,7 @@
         </p:nvSpPr>
         <p:spPr>
           <a:xfrm>
-            <a:off x="8420454" y="5321318"/>
+            <a:off x="7620714" y="5298849"/>
             <a:ext cx="2779058" cy="276999"/>
           </a:xfrm>
           <a:prstGeom prst="rect">
@@ -13229,7 +13226,7 @@
         </p:nvSpPr>
         <p:spPr>
           <a:xfrm>
-            <a:off x="8420454" y="5321318"/>
+            <a:off x="7620714" y="5310084"/>
             <a:ext cx="2779058" cy="276999"/>
           </a:xfrm>
           <a:prstGeom prst="rect">
@@ -22563,7 +22560,7 @@
         <p:spPr>
           <a:xfrm>
             <a:off x="2519080" y="4772900"/>
-            <a:ext cx="5727296" cy="1600438"/>
+            <a:ext cx="5727296" cy="984885"/>
           </a:xfrm>
           <a:prstGeom prst="rect">
             <a:avLst/>
@@ -22581,77 +22578,22 @@
               <a:buChar char="•"/>
             </a:pPr>
             <a:r>
+              <a:rPr lang="ca-ES" sz="2000" dirty="0" err="1">
+                <a:latin typeface="Arial" panose="020B0604020202020204" pitchFamily="34" charset="0"/>
+                <a:cs typeface="Arial" panose="020B0604020202020204" pitchFamily="34" charset="0"/>
+              </a:rPr>
+              <a:t>Evaluar</a:t>
+            </a:r>
+            <a:r>
               <a:rPr lang="ca-ES" sz="2000" dirty="0">
                 <a:latin typeface="Arial" panose="020B0604020202020204" pitchFamily="34" charset="0"/>
                 <a:cs typeface="Arial" panose="020B0604020202020204" pitchFamily="34" charset="0"/>
               </a:rPr>
-              <a:t>Tècniques:</a:t>
+              <a:t>:</a:t>
             </a:r>
           </a:p>
           <a:p>
-            <a:pPr marL="742950" lvl="1" indent="-285750">
-              <a:buFont typeface="Arial" panose="020B0604020202020204" pitchFamily="34" charset="0"/>
-              <a:buChar char="•"/>
-            </a:pPr>
-            <a:r>
-              <a:rPr lang="ca-ES" sz="2000" i="1" dirty="0" err="1">
-                <a:latin typeface="Arial" panose="020B0604020202020204" pitchFamily="34" charset="0"/>
-                <a:cs typeface="Arial" panose="020B0604020202020204" pitchFamily="34" charset="0"/>
-              </a:rPr>
-              <a:t>Grid</a:t>
-            </a:r>
-            <a:r>
-              <a:rPr lang="ca-ES" sz="2000" i="1" dirty="0">
-                <a:latin typeface="Arial" panose="020B0604020202020204" pitchFamily="34" charset="0"/>
-                <a:cs typeface="Arial" panose="020B0604020202020204" pitchFamily="34" charset="0"/>
-              </a:rPr>
-              <a:t> </a:t>
-            </a:r>
-            <a:r>
-              <a:rPr lang="ca-ES" sz="2000" i="1" dirty="0" err="1">
-                <a:latin typeface="Arial" panose="020B0604020202020204" pitchFamily="34" charset="0"/>
-                <a:cs typeface="Arial" panose="020B0604020202020204" pitchFamily="34" charset="0"/>
-              </a:rPr>
-              <a:t>SearchCV</a:t>
-            </a:r>
-            <a:endParaRPr lang="ca-ES" sz="2000" i="1" dirty="0">
-              <a:latin typeface="Arial" panose="020B0604020202020204" pitchFamily="34" charset="0"/>
-              <a:cs typeface="Arial" panose="020B0604020202020204" pitchFamily="34" charset="0"/>
-            </a:endParaRPr>
-          </a:p>
-          <a:p>
-            <a:pPr marL="742950" lvl="1" indent="-285750">
-              <a:buFont typeface="Arial" panose="020B0604020202020204" pitchFamily="34" charset="0"/>
-              <a:buChar char="•"/>
-            </a:pPr>
-            <a:r>
-              <a:rPr lang="ca-ES" sz="2000" i="1" dirty="0" err="1">
-                <a:latin typeface="Arial" panose="020B0604020202020204" pitchFamily="34" charset="0"/>
-                <a:cs typeface="Arial" panose="020B0604020202020204" pitchFamily="34" charset="0"/>
-              </a:rPr>
-              <a:t>Randomized</a:t>
-            </a:r>
-            <a:r>
-              <a:rPr lang="ca-ES" sz="2000" i="1" dirty="0">
-                <a:latin typeface="Arial" panose="020B0604020202020204" pitchFamily="34" charset="0"/>
-                <a:cs typeface="Arial" panose="020B0604020202020204" pitchFamily="34" charset="0"/>
-              </a:rPr>
-              <a:t> </a:t>
-            </a:r>
-            <a:r>
-              <a:rPr lang="ca-ES" sz="2000" i="1" dirty="0" err="1">
-                <a:latin typeface="Arial" panose="020B0604020202020204" pitchFamily="34" charset="0"/>
-                <a:cs typeface="Arial" panose="020B0604020202020204" pitchFamily="34" charset="0"/>
-              </a:rPr>
-              <a:t>SearchCV</a:t>
-            </a:r>
-            <a:endParaRPr lang="ca-ES" sz="2000" i="1" dirty="0">
-              <a:latin typeface="Arial" panose="020B0604020202020204" pitchFamily="34" charset="0"/>
-              <a:cs typeface="Arial" panose="020B0604020202020204" pitchFamily="34" charset="0"/>
-            </a:endParaRPr>
-          </a:p>
-          <a:p>
-            <a:pPr marL="742950" lvl="1" indent="-285750">
+            <a:pPr marL="800100" lvl="1" indent="-342900">
               <a:buFont typeface="Arial" panose="020B0604020202020204" pitchFamily="34" charset="0"/>
               <a:buChar char="•"/>
             </a:pPr>
@@ -22984,7 +22926,7 @@
         <p:spPr>
           <a:xfrm>
             <a:off x="2592924" y="1820411"/>
-            <a:ext cx="4420272" cy="2862322"/>
+            <a:ext cx="4420272" cy="2031325"/>
           </a:xfrm>
           <a:prstGeom prst="rect">
             <a:avLst/>
@@ -23006,7 +22948,7 @@
                 <a:latin typeface="Arial" panose="020B0604020202020204" pitchFamily="34" charset="0"/>
                 <a:cs typeface="Arial" panose="020B0604020202020204" pitchFamily="34" charset="0"/>
               </a:rPr>
-              <a:t>Models predictius no linears per fer tasques de regressió o classificació</a:t>
+              <a:t>Models que fan créixer arbres binaris</a:t>
             </a:r>
           </a:p>
           <a:p>
@@ -23029,7 +22971,7 @@
                 <a:latin typeface="Arial" panose="020B0604020202020204" pitchFamily="34" charset="0"/>
                 <a:cs typeface="Arial" panose="020B0604020202020204" pitchFamily="34" charset="0"/>
               </a:rPr>
-              <a:t>Arbres binaris on es formulen preguntes de si o no</a:t>
+              <a:t>S’escull l’entrada més rellevant a cada node</a:t>
             </a:r>
           </a:p>
           <a:p>
@@ -23067,29 +23009,6 @@
               </a:rPr>
               <a:t>Màxima profunditat</a:t>
             </a:r>
-          </a:p>
-          <a:p>
-            <a:pPr marL="742950" lvl="1" indent="-285750">
-              <a:buFont typeface="Arial" panose="020B0604020202020204" pitchFamily="34" charset="0"/>
-              <a:buChar char="•"/>
-            </a:pPr>
-            <a:r>
-              <a:rPr lang="ca-ES" b="1" dirty="0">
-                <a:latin typeface="Arial" panose="020B0604020202020204" pitchFamily="34" charset="0"/>
-                <a:cs typeface="Arial" panose="020B0604020202020204" pitchFamily="34" charset="0"/>
-              </a:rPr>
-              <a:t>Màxim nº de fulles</a:t>
-            </a:r>
-          </a:p>
-          <a:p>
-            <a:pPr marL="285750" indent="-285750">
-              <a:buFont typeface="Arial" panose="020B0604020202020204" pitchFamily="34" charset="0"/>
-              <a:buChar char="•"/>
-            </a:pPr>
-            <a:endParaRPr lang="ca-ES" dirty="0">
-              <a:latin typeface="Arial" panose="020B0604020202020204" pitchFamily="34" charset="0"/>
-              <a:cs typeface="Arial" panose="020B0604020202020204" pitchFamily="34" charset="0"/>
-            </a:endParaRPr>
           </a:p>
         </p:txBody>
       </p:sp>

</xml_diff>

<commit_message>
Presentacio tornada a organitzar i canvis en la distribucio petits
</commit_message>
<xml_diff>
--- a/presentació/presentacioTFG.pptx
+++ b/presentació/presentacioTFG.pptx
@@ -214,7 +214,7 @@
           <a:p>
             <a:fld id="{34220A30-021D-49B5-9554-42830D917518}" type="datetimeFigureOut">
               <a:rPr lang="ca-ES" smtClean="0"/>
-              <a:t>19/2/2019</a:t>
+              <a:t>21/2/2019</a:t>
             </a:fld>
             <a:endParaRPr lang="ca-ES"/>
           </a:p>
@@ -625,7 +625,7 @@
             <a:fld id="{B61BEF0D-F0BB-DE4B-95CE-6DB70DBA9567}" type="datetimeFigureOut">
               <a:rPr lang="en-US" smtClean="0"/>
               <a:pPr/>
-              <a:t>2/19/2019</a:t>
+              <a:t>2/21/2019</a:t>
             </a:fld>
             <a:endParaRPr lang="en-US" dirty="0"/>
           </a:p>
@@ -797,7 +797,7 @@
             <a:fld id="{B61BEF0D-F0BB-DE4B-95CE-6DB70DBA9567}" type="datetimeFigureOut">
               <a:rPr lang="en-US" smtClean="0"/>
               <a:pPr/>
-              <a:t>2/19/2019</a:t>
+              <a:t>2/21/2019</a:t>
             </a:fld>
             <a:endParaRPr lang="en-US" dirty="0"/>
           </a:p>
@@ -979,7 +979,7 @@
             <a:fld id="{B61BEF0D-F0BB-DE4B-95CE-6DB70DBA9567}" type="datetimeFigureOut">
               <a:rPr lang="en-US" smtClean="0"/>
               <a:pPr/>
-              <a:t>2/19/2019</a:t>
+              <a:t>2/21/2019</a:t>
             </a:fld>
             <a:endParaRPr lang="en-US" dirty="0"/>
           </a:p>
@@ -1230,7 +1230,7 @@
             <a:fld id="{B61BEF0D-F0BB-DE4B-95CE-6DB70DBA9567}" type="datetimeFigureOut">
               <a:rPr lang="en-US" smtClean="0"/>
               <a:pPr/>
-              <a:t>2/19/2019</a:t>
+              <a:t>2/21/2019</a:t>
             </a:fld>
             <a:endParaRPr lang="en-US" dirty="0"/>
           </a:p>
@@ -1499,7 +1499,7 @@
             <a:fld id="{B61BEF0D-F0BB-DE4B-95CE-6DB70DBA9567}" type="datetimeFigureOut">
               <a:rPr lang="en-US" smtClean="0"/>
               <a:pPr/>
-              <a:t>2/19/2019</a:t>
+              <a:t>2/21/2019</a:t>
             </a:fld>
             <a:endParaRPr lang="en-US" dirty="0"/>
           </a:p>
@@ -1830,7 +1830,7 @@
             <a:fld id="{B61BEF0D-F0BB-DE4B-95CE-6DB70DBA9567}" type="datetimeFigureOut">
               <a:rPr lang="en-US" smtClean="0"/>
               <a:pPr/>
-              <a:t>2/19/2019</a:t>
+              <a:t>2/21/2019</a:t>
             </a:fld>
             <a:endParaRPr lang="en-US" dirty="0"/>
           </a:p>
@@ -2155,7 +2155,7 @@
             <a:fld id="{B61BEF0D-F0BB-DE4B-95CE-6DB70DBA9567}" type="datetimeFigureOut">
               <a:rPr lang="en-US" smtClean="0"/>
               <a:pPr/>
-              <a:t>2/19/2019</a:t>
+              <a:t>2/21/2019</a:t>
             </a:fld>
             <a:endParaRPr lang="en-US" dirty="0"/>
           </a:p>
@@ -2614,7 +2614,7 @@
             <a:fld id="{B61BEF0D-F0BB-DE4B-95CE-6DB70DBA9567}" type="datetimeFigureOut">
               <a:rPr lang="en-US" smtClean="0"/>
               <a:pPr/>
-              <a:t>2/19/2019</a:t>
+              <a:t>2/21/2019</a:t>
             </a:fld>
             <a:endParaRPr lang="en-US" dirty="0"/>
           </a:p>
@@ -2821,7 +2821,7 @@
             <a:fld id="{B61BEF0D-F0BB-DE4B-95CE-6DB70DBA9567}" type="datetimeFigureOut">
               <a:rPr lang="en-US" smtClean="0"/>
               <a:pPr/>
-              <a:t>2/19/2019</a:t>
+              <a:t>2/21/2019</a:t>
             </a:fld>
             <a:endParaRPr lang="en-US" dirty="0"/>
           </a:p>
@@ -3000,7 +3000,7 @@
             <a:fld id="{B61BEF0D-F0BB-DE4B-95CE-6DB70DBA9567}" type="datetimeFigureOut">
               <a:rPr lang="en-US" smtClean="0"/>
               <a:pPr/>
-              <a:t>2/19/2019</a:t>
+              <a:t>2/21/2019</a:t>
             </a:fld>
             <a:endParaRPr lang="en-US" dirty="0"/>
           </a:p>
@@ -3335,7 +3335,7 @@
             <a:fld id="{B61BEF0D-F0BB-DE4B-95CE-6DB70DBA9567}" type="datetimeFigureOut">
               <a:rPr lang="en-US" smtClean="0"/>
               <a:pPr/>
-              <a:t>2/19/2019</a:t>
+              <a:t>2/21/2019</a:t>
             </a:fld>
             <a:endParaRPr lang="en-US" dirty="0"/>
           </a:p>
@@ -3589,7 +3589,7 @@
             <a:fld id="{B61BEF0D-F0BB-DE4B-95CE-6DB70DBA9567}" type="datetimeFigureOut">
               <a:rPr lang="en-US" smtClean="0"/>
               <a:pPr/>
-              <a:t>2/19/2019</a:t>
+              <a:t>2/21/2019</a:t>
             </a:fld>
             <a:endParaRPr lang="en-US" dirty="0"/>
           </a:p>
@@ -3854,7 +3854,7 @@
             <a:fld id="{B61BEF0D-F0BB-DE4B-95CE-6DB70DBA9567}" type="datetimeFigureOut">
               <a:rPr lang="en-US" smtClean="0"/>
               <a:pPr/>
-              <a:t>2/19/2019</a:t>
+              <a:t>2/21/2019</a:t>
             </a:fld>
             <a:endParaRPr lang="en-US" dirty="0"/>
           </a:p>
@@ -4194,7 +4194,7 @@
             <a:fld id="{B61BEF0D-F0BB-DE4B-95CE-6DB70DBA9567}" type="datetimeFigureOut">
               <a:rPr lang="en-US" smtClean="0"/>
               <a:pPr/>
-              <a:t>2/19/2019</a:t>
+              <a:t>2/21/2019</a:t>
             </a:fld>
             <a:endParaRPr lang="en-US" dirty="0"/>
           </a:p>
@@ -4597,7 +4597,7 @@
             <a:fld id="{B61BEF0D-F0BB-DE4B-95CE-6DB70DBA9567}" type="datetimeFigureOut">
               <a:rPr lang="en-US" smtClean="0"/>
               <a:pPr/>
-              <a:t>2/19/2019</a:t>
+              <a:t>2/21/2019</a:t>
             </a:fld>
             <a:endParaRPr lang="en-US" dirty="0"/>
           </a:p>
@@ -4934,7 +4934,7 @@
             <a:fld id="{B61BEF0D-F0BB-DE4B-95CE-6DB70DBA9567}" type="datetimeFigureOut">
               <a:rPr lang="en-US" smtClean="0"/>
               <a:pPr/>
-              <a:t>2/19/2019</a:t>
+              <a:t>2/21/2019</a:t>
             </a:fld>
             <a:endParaRPr lang="en-US" dirty="0"/>
           </a:p>
@@ -5256,7 +5256,7 @@
             <a:fld id="{B61BEF0D-F0BB-DE4B-95CE-6DB70DBA9567}" type="datetimeFigureOut">
               <a:rPr lang="en-US" smtClean="0"/>
               <a:pPr/>
-              <a:t>2/19/2019</a:t>
+              <a:t>2/21/2019</a:t>
             </a:fld>
             <a:endParaRPr lang="en-US" dirty="0"/>
           </a:p>
@@ -5654,7 +5654,7 @@
             <a:fld id="{B61BEF0D-F0BB-DE4B-95CE-6DB70DBA9567}" type="datetimeFigureOut">
               <a:rPr lang="en-US" smtClean="0"/>
               <a:pPr/>
-              <a:t>2/19/2019</a:t>
+              <a:t>2/21/2019</a:t>
             </a:fld>
             <a:endParaRPr lang="en-US" dirty="0"/>
           </a:p>
@@ -5913,7 +5913,7 @@
             <a:fld id="{B61BEF0D-F0BB-DE4B-95CE-6DB70DBA9567}" type="datetimeFigureOut">
               <a:rPr lang="en-US" smtClean="0"/>
               <a:pPr/>
-              <a:t>2/19/2019</a:t>
+              <a:t>2/21/2019</a:t>
             </a:fld>
             <a:endParaRPr lang="en-US" dirty="0"/>
           </a:p>
@@ -6177,7 +6177,7 @@
             <a:fld id="{B61BEF0D-F0BB-DE4B-95CE-6DB70DBA9567}" type="datetimeFigureOut">
               <a:rPr lang="en-US" smtClean="0"/>
               <a:pPr/>
-              <a:t>2/19/2019</a:t>
+              <a:t>2/21/2019</a:t>
             </a:fld>
             <a:endParaRPr lang="en-US" dirty="0"/>
           </a:p>
@@ -6512,7 +6512,7 @@
             <a:fld id="{B61BEF0D-F0BB-DE4B-95CE-6DB70DBA9567}" type="datetimeFigureOut">
               <a:rPr lang="en-US" smtClean="0"/>
               <a:pPr/>
-              <a:t>2/19/2019</a:t>
+              <a:t>2/21/2019</a:t>
             </a:fld>
             <a:endParaRPr lang="en-US" dirty="0"/>
           </a:p>
@@ -6746,7 +6746,7 @@
             <a:fld id="{B61BEF0D-F0BB-DE4B-95CE-6DB70DBA9567}" type="datetimeFigureOut">
               <a:rPr lang="en-US" smtClean="0"/>
               <a:pPr/>
-              <a:t>2/19/2019</a:t>
+              <a:t>2/21/2019</a:t>
             </a:fld>
             <a:endParaRPr lang="en-US" dirty="0"/>
           </a:p>
@@ -7095,7 +7095,7 @@
             <a:fld id="{B61BEF0D-F0BB-DE4B-95CE-6DB70DBA9567}" type="datetimeFigureOut">
               <a:rPr lang="en-US" smtClean="0"/>
               <a:pPr/>
-              <a:t>2/19/2019</a:t>
+              <a:t>2/21/2019</a:t>
             </a:fld>
             <a:endParaRPr lang="en-US" dirty="0"/>
           </a:p>
@@ -7215,7 +7215,7 @@
             <a:fld id="{B61BEF0D-F0BB-DE4B-95CE-6DB70DBA9567}" type="datetimeFigureOut">
               <a:rPr lang="en-US" smtClean="0"/>
               <a:pPr/>
-              <a:t>2/19/2019</a:t>
+              <a:t>2/21/2019</a:t>
             </a:fld>
             <a:endParaRPr lang="en-US" dirty="0"/>
           </a:p>
@@ -7335,7 +7335,7 @@
             <a:fld id="{B61BEF0D-F0BB-DE4B-95CE-6DB70DBA9567}" type="datetimeFigureOut">
               <a:rPr lang="en-US" smtClean="0"/>
               <a:pPr/>
-              <a:t>2/19/2019</a:t>
+              <a:t>2/21/2019</a:t>
             </a:fld>
             <a:endParaRPr lang="en-US" dirty="0"/>
           </a:p>
@@ -7621,7 +7621,7 @@
             <a:fld id="{B61BEF0D-F0BB-DE4B-95CE-6DB70DBA9567}" type="datetimeFigureOut">
               <a:rPr lang="en-US" smtClean="0"/>
               <a:pPr/>
-              <a:t>2/19/2019</a:t>
+              <a:t>2/21/2019</a:t>
             </a:fld>
             <a:endParaRPr lang="en-US" dirty="0"/>
           </a:p>
@@ -7887,7 +7887,7 @@
             <a:fld id="{B61BEF0D-F0BB-DE4B-95CE-6DB70DBA9567}" type="datetimeFigureOut">
               <a:rPr lang="en-US" smtClean="0"/>
               <a:pPr/>
-              <a:t>2/19/2019</a:t>
+              <a:t>2/21/2019</a:t>
             </a:fld>
             <a:endParaRPr lang="en-US" dirty="0"/>
           </a:p>
@@ -8125,7 +8125,7 @@
             <a:fld id="{B61BEF0D-F0BB-DE4B-95CE-6DB70DBA9567}" type="datetimeFigureOut">
               <a:rPr lang="en-US" smtClean="0"/>
               <a:pPr/>
-              <a:t>2/19/2019</a:t>
+              <a:t>2/21/2019</a:t>
             </a:fld>
             <a:endParaRPr lang="en-US" dirty="0"/>
           </a:p>
@@ -10495,7 +10495,7 @@
             <a:fld id="{B61BEF0D-F0BB-DE4B-95CE-6DB70DBA9567}" type="datetimeFigureOut">
               <a:rPr lang="en-US" smtClean="0"/>
               <a:pPr/>
-              <a:t>2/19/2019</a:t>
+              <a:t>2/21/2019</a:t>
             </a:fld>
             <a:endParaRPr lang="en-US" dirty="0"/>
           </a:p>
@@ -11563,7 +11563,7 @@
                 <a:latin typeface="Arial" panose="020B0604020202020204" pitchFamily="34" charset="0"/>
                 <a:cs typeface="Arial" panose="020B0604020202020204" pitchFamily="34" charset="0"/>
               </a:rPr>
-              <a:t>Busca hiperplans amb X(entrades) dimensions amb distància màxima als punts</a:t>
+              <a:t>Aconseguir una funció amb resultats per sota d’una desviació límit</a:t>
             </a:r>
           </a:p>
           <a:p>
@@ -12024,8 +12024,38 @@
         </p:blipFill>
         <p:spPr>
           <a:xfrm>
-            <a:off x="2918894" y="1620978"/>
-            <a:ext cx="6354211" cy="4612912"/>
+            <a:off x="1296908" y="2059301"/>
+            <a:ext cx="4482646" cy="3254228"/>
+          </a:xfrm>
+          <a:prstGeom prst="rect">
+            <a:avLst/>
+          </a:prstGeom>
+        </p:spPr>
+      </p:pic>
+      <p:pic>
+        <p:nvPicPr>
+          <p:cNvPr id="4" name="Imagen 3">
+            <a:extLst>
+              <a:ext uri="{FF2B5EF4-FFF2-40B4-BE49-F238E27FC236}">
+                <a16:creationId xmlns:a16="http://schemas.microsoft.com/office/drawing/2014/main" id="{2A257935-1167-4D79-9D32-8BEE16E20B4B}"/>
+              </a:ext>
+            </a:extLst>
+          </p:cNvPr>
+          <p:cNvPicPr>
+            <a:picLocks noChangeAspect="1"/>
+          </p:cNvPicPr>
+          <p:nvPr/>
+        </p:nvPicPr>
+        <p:blipFill>
+          <a:blip r:embed="rId3"/>
+          <a:stretch>
+            <a:fillRect/>
+          </a:stretch>
+        </p:blipFill>
+        <p:spPr>
+          <a:xfrm>
+            <a:off x="7048767" y="1905000"/>
+            <a:ext cx="3846325" cy="3562831"/>
           </a:xfrm>
           <a:prstGeom prst="rect">
             <a:avLst/>
@@ -12042,6 +12072,81 @@
   <p:clrMapOvr>
     <a:masterClrMapping/>
   </p:clrMapOvr>
+  <p:timing>
+    <p:tnLst>
+      <p:par>
+        <p:cTn id="1" dur="indefinite" restart="never" nodeType="tmRoot">
+          <p:childTnLst>
+            <p:seq concurrent="1" nextAc="seek">
+              <p:cTn id="2" dur="indefinite" nodeType="mainSeq">
+                <p:childTnLst>
+                  <p:par>
+                    <p:cTn id="3" fill="hold">
+                      <p:stCondLst>
+                        <p:cond delay="indefinite"/>
+                      </p:stCondLst>
+                      <p:childTnLst>
+                        <p:par>
+                          <p:cTn id="4" fill="hold">
+                            <p:stCondLst>
+                              <p:cond delay="0"/>
+                            </p:stCondLst>
+                            <p:childTnLst>
+                              <p:par>
+                                <p:cTn id="5" presetID="1" presetClass="entr" presetSubtype="0" fill="hold" nodeType="clickEffect">
+                                  <p:stCondLst>
+                                    <p:cond delay="0"/>
+                                  </p:stCondLst>
+                                  <p:childTnLst>
+                                    <p:set>
+                                      <p:cBhvr>
+                                        <p:cTn id="6" dur="1" fill="hold">
+                                          <p:stCondLst>
+                                            <p:cond delay="0"/>
+                                          </p:stCondLst>
+                                        </p:cTn>
+                                        <p:tgtEl>
+                                          <p:spTgt spid="4"/>
+                                        </p:tgtEl>
+                                        <p:attrNameLst>
+                                          <p:attrName>style.visibility</p:attrName>
+                                        </p:attrNameLst>
+                                      </p:cBhvr>
+                                      <p:to>
+                                        <p:strVal val="visible"/>
+                                      </p:to>
+                                    </p:set>
+                                  </p:childTnLst>
+                                </p:cTn>
+                              </p:par>
+                            </p:childTnLst>
+                          </p:cTn>
+                        </p:par>
+                      </p:childTnLst>
+                    </p:cTn>
+                  </p:par>
+                </p:childTnLst>
+              </p:cTn>
+              <p:prevCondLst>
+                <p:cond evt="onPrev" delay="0">
+                  <p:tgtEl>
+                    <p:sldTgt/>
+                  </p:tgtEl>
+                </p:cond>
+              </p:prevCondLst>
+              <p:nextCondLst>
+                <p:cond evt="onNext" delay="0">
+                  <p:tgtEl>
+                    <p:sldTgt/>
+                  </p:tgtEl>
+                </p:cond>
+              </p:nextCondLst>
+            </p:seq>
+          </p:childTnLst>
+        </p:cTn>
+      </p:par>
+    </p:tnLst>
+  </p:timing>
 </p:sld>
 </file>
 
@@ -12697,33 +12802,15 @@
                                   </p:childTnLst>
                                 </p:cTn>
                               </p:par>
-                            </p:childTnLst>
-                          </p:cTn>
-                        </p:par>
-                      </p:childTnLst>
-                    </p:cTn>
-                  </p:par>
-                  <p:par>
-                    <p:cTn id="7" fill="hold">
-                      <p:stCondLst>
-                        <p:cond delay="indefinite"/>
-                      </p:stCondLst>
-                      <p:childTnLst>
-                        <p:par>
-                          <p:cTn id="8" fill="hold">
-                            <p:stCondLst>
-                              <p:cond delay="0"/>
-                            </p:stCondLst>
-                            <p:childTnLst>
                               <p:par>
-                                <p:cTn id="9" presetID="1" presetClass="entr" presetSubtype="0" fill="hold" nodeType="clickEffect">
+                                <p:cTn id="7" presetID="1" presetClass="entr" presetSubtype="0" fill="hold" nodeType="withEffect">
                                   <p:stCondLst>
                                     <p:cond delay="0"/>
                                   </p:stCondLst>
                                   <p:childTnLst>
                                     <p:set>
                                       <p:cBhvr>
-                                        <p:cTn id="10" dur="1" fill="hold">
+                                        <p:cTn id="8" dur="1" fill="hold">
                                           <p:stCondLst>
                                             <p:cond delay="0"/>
                                           </p:stCondLst>
@@ -12742,33 +12829,15 @@
                                   </p:childTnLst>
                                 </p:cTn>
                               </p:par>
-                            </p:childTnLst>
-                          </p:cTn>
-                        </p:par>
-                      </p:childTnLst>
-                    </p:cTn>
-                  </p:par>
-                  <p:par>
-                    <p:cTn id="11" fill="hold">
-                      <p:stCondLst>
-                        <p:cond delay="indefinite"/>
-                      </p:stCondLst>
-                      <p:childTnLst>
-                        <p:par>
-                          <p:cTn id="12" fill="hold">
-                            <p:stCondLst>
-                              <p:cond delay="0"/>
-                            </p:stCondLst>
-                            <p:childTnLst>
                               <p:par>
-                                <p:cTn id="13" presetID="1" presetClass="entr" presetSubtype="0" fill="hold" nodeType="clickEffect">
+                                <p:cTn id="9" presetID="1" presetClass="entr" presetSubtype="0" fill="hold" nodeType="withEffect">
                                   <p:stCondLst>
                                     <p:cond delay="0"/>
                                   </p:stCondLst>
                                   <p:childTnLst>
                                     <p:set>
                                       <p:cBhvr>
-                                        <p:cTn id="14" dur="1" fill="hold">
+                                        <p:cTn id="10" dur="1" fill="hold">
                                           <p:stCondLst>
                                             <p:cond delay="0"/>
                                           </p:stCondLst>
@@ -12787,33 +12856,15 @@
                                   </p:childTnLst>
                                 </p:cTn>
                               </p:par>
-                            </p:childTnLst>
-                          </p:cTn>
-                        </p:par>
-                      </p:childTnLst>
-                    </p:cTn>
-                  </p:par>
-                  <p:par>
-                    <p:cTn id="15" fill="hold">
-                      <p:stCondLst>
-                        <p:cond delay="indefinite"/>
-                      </p:stCondLst>
-                      <p:childTnLst>
-                        <p:par>
-                          <p:cTn id="16" fill="hold">
-                            <p:stCondLst>
-                              <p:cond delay="0"/>
-                            </p:stCondLst>
-                            <p:childTnLst>
                               <p:par>
-                                <p:cTn id="17" presetID="1" presetClass="entr" presetSubtype="0" fill="hold" nodeType="clickEffect">
+                                <p:cTn id="11" presetID="1" presetClass="entr" presetSubtype="0" fill="hold" nodeType="withEffect">
                                   <p:stCondLst>
                                     <p:cond delay="0"/>
                                   </p:stCondLst>
                                   <p:childTnLst>
                                     <p:set>
                                       <p:cBhvr>
-                                        <p:cTn id="18" dur="1" fill="hold">
+                                        <p:cTn id="12" dur="1" fill="hold">
                                           <p:stCondLst>
                                             <p:cond delay="0"/>
                                           </p:stCondLst>
@@ -12839,26 +12890,26 @@
                     </p:cTn>
                   </p:par>
                   <p:par>
-                    <p:cTn id="19" fill="hold">
+                    <p:cTn id="13" fill="hold">
                       <p:stCondLst>
                         <p:cond delay="indefinite"/>
                       </p:stCondLst>
                       <p:childTnLst>
                         <p:par>
-                          <p:cTn id="20" fill="hold">
+                          <p:cTn id="14" fill="hold">
                             <p:stCondLst>
                               <p:cond delay="0"/>
                             </p:stCondLst>
                             <p:childTnLst>
                               <p:par>
-                                <p:cTn id="21" presetID="1" presetClass="entr" presetSubtype="0" fill="hold" nodeType="clickEffect">
+                                <p:cTn id="15" presetID="1" presetClass="entr" presetSubtype="0" fill="hold" nodeType="clickEffect">
                                   <p:stCondLst>
                                     <p:cond delay="0"/>
                                   </p:stCondLst>
                                   <p:childTnLst>
                                     <p:set>
                                       <p:cBhvr>
-                                        <p:cTn id="22" dur="1" fill="hold">
+                                        <p:cTn id="16" dur="1" fill="hold">
                                           <p:stCondLst>
                                             <p:cond delay="0"/>
                                           </p:stCondLst>
@@ -12961,6 +13012,36 @@
           </a:p>
         </p:txBody>
       </p:sp>
+      <p:pic>
+        <p:nvPicPr>
+          <p:cNvPr id="4" name="Imagen 3">
+            <a:extLst>
+              <a:ext uri="{FF2B5EF4-FFF2-40B4-BE49-F238E27FC236}">
+                <a16:creationId xmlns:a16="http://schemas.microsoft.com/office/drawing/2014/main" id="{D16E7DD0-3A59-4DCB-8C41-CCFA76BFD208}"/>
+              </a:ext>
+            </a:extLst>
+          </p:cNvPr>
+          <p:cNvPicPr>
+            <a:picLocks noChangeAspect="1"/>
+          </p:cNvPicPr>
+          <p:nvPr/>
+        </p:nvPicPr>
+        <p:blipFill>
+          <a:blip r:embed="rId2"/>
+          <a:stretch>
+            <a:fillRect/>
+          </a:stretch>
+        </p:blipFill>
+        <p:spPr>
+          <a:xfrm>
+            <a:off x="7752731" y="4580877"/>
+            <a:ext cx="3907951" cy="2045161"/>
+          </a:xfrm>
+          <a:prstGeom prst="rect">
+            <a:avLst/>
+          </a:prstGeom>
+        </p:spPr>
+      </p:pic>
     </p:spTree>
     <p:extLst>
       <p:ext uri="{BB962C8B-B14F-4D97-AF65-F5344CB8AC3E}">
@@ -13621,13 +13702,13 @@
           <p:nvPr>
             <p:extLst>
               <p:ext uri="{D42A27DB-BD31-4B8C-83A1-F6EECF244321}">
-                <p14:modId xmlns:p14="http://schemas.microsoft.com/office/powerpoint/2010/main" val="2321298440"/>
+                <p14:modId xmlns:p14="http://schemas.microsoft.com/office/powerpoint/2010/main" val="435892621"/>
               </p:ext>
             </p:extLst>
           </p:nvPr>
         </p:nvGraphicFramePr>
         <p:xfrm>
-          <a:off x="761565" y="2327222"/>
+          <a:off x="3495887" y="2193375"/>
           <a:ext cx="6075464" cy="2203556"/>
         </p:xfrm>
         <a:graphic>
@@ -14807,7 +14888,7 @@
         </p:nvSpPr>
         <p:spPr>
           <a:xfrm>
-            <a:off x="2251526" y="4796242"/>
+            <a:off x="4578984" y="4719258"/>
             <a:ext cx="3909270" cy="369332"/>
           </a:xfrm>
           <a:prstGeom prst="rect">
@@ -14828,82 +14909,6 @@
               </a:rPr>
               <a:t>Conjunt de dades temperatures</a:t>
             </a:r>
-          </a:p>
-        </p:txBody>
-      </p:sp>
-      <p:pic>
-        <p:nvPicPr>
-          <p:cNvPr id="7" name="Imagen 6">
-            <a:extLst>
-              <a:ext uri="{FF2B5EF4-FFF2-40B4-BE49-F238E27FC236}">
-                <a16:creationId xmlns:a16="http://schemas.microsoft.com/office/drawing/2014/main" id="{EB56CE17-007B-4C82-A8A1-E8EDBE26068A}"/>
-              </a:ext>
-            </a:extLst>
-          </p:cNvPr>
-          <p:cNvPicPr>
-            <a:picLocks noChangeAspect="1"/>
-          </p:cNvPicPr>
-          <p:nvPr/>
-        </p:nvPicPr>
-        <p:blipFill>
-          <a:blip r:embed="rId2"/>
-          <a:stretch>
-            <a:fillRect/>
-          </a:stretch>
-        </p:blipFill>
-        <p:spPr>
-          <a:xfrm>
-            <a:off x="7836043" y="1799470"/>
-            <a:ext cx="3846325" cy="3562831"/>
-          </a:xfrm>
-          <a:prstGeom prst="rect">
-            <a:avLst/>
-          </a:prstGeom>
-        </p:spPr>
-      </p:pic>
-      <p:sp>
-        <p:nvSpPr>
-          <p:cNvPr id="8" name="Flecha: a la derecha 7">
-            <a:extLst>
-              <a:ext uri="{FF2B5EF4-FFF2-40B4-BE49-F238E27FC236}">
-                <a16:creationId xmlns:a16="http://schemas.microsoft.com/office/drawing/2014/main" id="{934FF08E-4831-4C4C-9081-A53755F03645}"/>
-              </a:ext>
-            </a:extLst>
-          </p:cNvPr>
-          <p:cNvSpPr/>
-          <p:nvPr/>
-        </p:nvSpPr>
-        <p:spPr>
-          <a:xfrm>
-            <a:off x="6891556" y="3143774"/>
-            <a:ext cx="889959" cy="285226"/>
-          </a:xfrm>
-          <a:prstGeom prst="rightArrow">
-            <a:avLst/>
-          </a:prstGeom>
-        </p:spPr>
-        <p:style>
-          <a:lnRef idx="2">
-            <a:schemeClr val="accent6">
-              <a:shade val="50000"/>
-            </a:schemeClr>
-          </a:lnRef>
-          <a:fillRef idx="1">
-            <a:schemeClr val="accent6"/>
-          </a:fillRef>
-          <a:effectRef idx="0">
-            <a:schemeClr val="accent6"/>
-          </a:effectRef>
-          <a:fontRef idx="minor">
-            <a:schemeClr val="lt1"/>
-          </a:fontRef>
-        </p:style>
-        <p:txBody>
-          <a:bodyPr rtlCol="0" anchor="ctr"/>
-          <a:lstStyle/>
-          <a:p>
-            <a:pPr algn="ctr"/>
-            <a:endParaRPr lang="ca-ES"/>
           </a:p>
         </p:txBody>
       </p:sp>
@@ -14922,13 +14927,13 @@
           <p:nvPr>
             <p:extLst>
               <p:ext uri="{D42A27DB-BD31-4B8C-83A1-F6EECF244321}">
-                <p14:modId xmlns:p14="http://schemas.microsoft.com/office/powerpoint/2010/main" val="1404384454"/>
+                <p14:modId xmlns:p14="http://schemas.microsoft.com/office/powerpoint/2010/main" val="769168522"/>
               </p:ext>
             </p:extLst>
           </p:nvPr>
         </p:nvGraphicFramePr>
         <p:xfrm>
-          <a:off x="761565" y="2312366"/>
+          <a:off x="3495887" y="2193375"/>
           <a:ext cx="6075464" cy="2490255"/>
         </p:xfrm>
         <a:graphic>
@@ -16100,7 +16105,7 @@
         </p:nvSpPr>
         <p:spPr>
           <a:xfrm>
-            <a:off x="2209439" y="4836483"/>
+            <a:off x="4578984" y="4754886"/>
             <a:ext cx="4209875" cy="369332"/>
           </a:xfrm>
           <a:prstGeom prst="rect">
@@ -16123,60 +16128,6 @@
               </a:rPr>
               <a:t>Conjunt de dades emissions gasos</a:t>
             </a:r>
-          </a:p>
-        </p:txBody>
-      </p:sp>
-      <p:sp>
-        <p:nvSpPr>
-          <p:cNvPr id="11" name="Rectángulo 10">
-            <a:extLst>
-              <a:ext uri="{FF2B5EF4-FFF2-40B4-BE49-F238E27FC236}">
-                <a16:creationId xmlns:a16="http://schemas.microsoft.com/office/drawing/2014/main" id="{BA7ADCB9-0920-4141-BBC5-C88ED0087230}"/>
-              </a:ext>
-            </a:extLst>
-          </p:cNvPr>
-          <p:cNvSpPr/>
-          <p:nvPr/>
-        </p:nvSpPr>
-        <p:spPr>
-          <a:xfrm>
-            <a:off x="6891557" y="1495699"/>
-            <a:ext cx="4790811" cy="4447712"/>
-          </a:xfrm>
-          <a:prstGeom prst="rect">
-            <a:avLst/>
-          </a:prstGeom>
-          <a:solidFill>
-            <a:schemeClr val="bg1"/>
-          </a:solidFill>
-          <a:ln>
-            <a:solidFill>
-              <a:schemeClr val="bg1"/>
-            </a:solidFill>
-          </a:ln>
-        </p:spPr>
-        <p:style>
-          <a:lnRef idx="2">
-            <a:schemeClr val="accent1">
-              <a:shade val="50000"/>
-            </a:schemeClr>
-          </a:lnRef>
-          <a:fillRef idx="1">
-            <a:schemeClr val="accent1"/>
-          </a:fillRef>
-          <a:effectRef idx="0">
-            <a:schemeClr val="accent1"/>
-          </a:effectRef>
-          <a:fontRef idx="minor">
-            <a:schemeClr val="lt1"/>
-          </a:fontRef>
-        </p:style>
-        <p:txBody>
-          <a:bodyPr rtlCol="0" anchor="ctr"/>
-          <a:lstStyle/>
-          <a:p>
-            <a:pPr algn="ctr"/>
-            <a:endParaRPr lang="ca-ES"/>
           </a:p>
         </p:txBody>
       </p:sp>
@@ -16211,7 +16162,7 @@
                             </p:stCondLst>
                             <p:childTnLst>
                               <p:par>
-                                <p:cTn id="5" presetID="1" presetClass="entr" presetSubtype="0" fill="hold" grpId="0" nodeType="clickEffect">
+                                <p:cTn id="5" presetID="1" presetClass="exit" presetSubtype="0" fill="hold" nodeType="clickEffect">
                                   <p:stCondLst>
                                     <p:cond delay="0"/>
                                   </p:stCondLst>
@@ -16224,14 +16175,14 @@
                                           </p:stCondLst>
                                         </p:cTn>
                                         <p:tgtEl>
-                                          <p:spTgt spid="8"/>
+                                          <p:spTgt spid="3"/>
                                         </p:tgtEl>
                                         <p:attrNameLst>
                                           <p:attrName>style.visibility</p:attrName>
                                         </p:attrNameLst>
                                       </p:cBhvr>
                                       <p:to>
-                                        <p:strVal val="visible"/>
+                                        <p:strVal val="hidden"/>
                                       </p:to>
                                     </p:set>
                                   </p:childTnLst>
@@ -16251,105 +16202,6 @@
                                           </p:stCondLst>
                                         </p:cTn>
                                         <p:tgtEl>
-                                          <p:spTgt spid="7"/>
-                                        </p:tgtEl>
-                                        <p:attrNameLst>
-                                          <p:attrName>style.visibility</p:attrName>
-                                        </p:attrNameLst>
-                                      </p:cBhvr>
-                                      <p:to>
-                                        <p:strVal val="visible"/>
-                                      </p:to>
-                                    </p:set>
-                                  </p:childTnLst>
-                                </p:cTn>
-                              </p:par>
-                            </p:childTnLst>
-                          </p:cTn>
-                        </p:par>
-                      </p:childTnLst>
-                    </p:cTn>
-                  </p:par>
-                  <p:par>
-                    <p:cTn id="9" fill="hold">
-                      <p:stCondLst>
-                        <p:cond delay="indefinite"/>
-                      </p:stCondLst>
-                      <p:childTnLst>
-                        <p:par>
-                          <p:cTn id="10" fill="hold">
-                            <p:stCondLst>
-                              <p:cond delay="0"/>
-                            </p:stCondLst>
-                            <p:childTnLst>
-                              <p:par>
-                                <p:cTn id="11" presetID="1" presetClass="exit" presetSubtype="0" fill="hold" nodeType="clickEffect">
-                                  <p:stCondLst>
-                                    <p:cond delay="0"/>
-                                  </p:stCondLst>
-                                  <p:childTnLst>
-                                    <p:set>
-                                      <p:cBhvr>
-                                        <p:cTn id="12" dur="1" fill="hold">
-                                          <p:stCondLst>
-                                            <p:cond delay="0"/>
-                                          </p:stCondLst>
-                                        </p:cTn>
-                                        <p:tgtEl>
-                                          <p:spTgt spid="3"/>
-                                        </p:tgtEl>
-                                        <p:attrNameLst>
-                                          <p:attrName>style.visibility</p:attrName>
-                                        </p:attrNameLst>
-                                      </p:cBhvr>
-                                      <p:to>
-                                        <p:strVal val="hidden"/>
-                                      </p:to>
-                                    </p:set>
-                                  </p:childTnLst>
-                                </p:cTn>
-                              </p:par>
-                              <p:par>
-                                <p:cTn id="13" presetID="1" presetClass="entr" presetSubtype="0" fill="hold" grpId="0" nodeType="withEffect">
-                                  <p:stCondLst>
-                                    <p:cond delay="0"/>
-                                  </p:stCondLst>
-                                  <p:childTnLst>
-                                    <p:set>
-                                      <p:cBhvr>
-                                        <p:cTn id="14" dur="1" fill="hold">
-                                          <p:stCondLst>
-                                            <p:cond delay="0"/>
-                                          </p:stCondLst>
-                                        </p:cTn>
-                                        <p:tgtEl>
-                                          <p:spTgt spid="11"/>
-                                        </p:tgtEl>
-                                        <p:attrNameLst>
-                                          <p:attrName>style.visibility</p:attrName>
-                                        </p:attrNameLst>
-                                      </p:cBhvr>
-                                      <p:to>
-                                        <p:strVal val="visible"/>
-                                      </p:to>
-                                    </p:set>
-                                  </p:childTnLst>
-                                </p:cTn>
-                              </p:par>
-                              <p:par>
-                                <p:cTn id="15" presetID="1" presetClass="entr" presetSubtype="0" fill="hold" nodeType="withEffect">
-                                  <p:stCondLst>
-                                    <p:cond delay="0"/>
-                                  </p:stCondLst>
-                                  <p:childTnLst>
-                                    <p:set>
-                                      <p:cBhvr>
-                                        <p:cTn id="16" dur="1" fill="hold">
-                                          <p:stCondLst>
-                                            <p:cond delay="0"/>
-                                          </p:stCondLst>
-                                        </p:cTn>
-                                        <p:tgtEl>
                                           <p:spTgt spid="9"/>
                                         </p:tgtEl>
                                         <p:attrNameLst>
@@ -16364,14 +16216,14 @@
                                 </p:cTn>
                               </p:par>
                               <p:par>
-                                <p:cTn id="17" presetID="1" presetClass="entr" presetSubtype="0" fill="hold" grpId="0" nodeType="withEffect">
+                                <p:cTn id="9" presetID="1" presetClass="entr" presetSubtype="0" fill="hold" grpId="0" nodeType="withEffect">
                                   <p:stCondLst>
                                     <p:cond delay="0"/>
                                   </p:stCondLst>
                                   <p:childTnLst>
                                     <p:set>
                                       <p:cBhvr>
-                                        <p:cTn id="18" dur="1" fill="hold">
+                                        <p:cTn id="10" dur="1" fill="hold">
                                           <p:stCondLst>
                                             <p:cond delay="0"/>
                                           </p:stCondLst>
@@ -16418,9 +16270,7 @@
       </p:par>
     </p:tnLst>
     <p:bldLst>
-      <p:bldP spid="8" grpId="0" animBg="1"/>
       <p:bldP spid="10" grpId="0" animBg="1"/>
-      <p:bldP spid="11" grpId="0" animBg="1"/>
     </p:bldLst>
   </p:timing>
 </p:sld>
@@ -22309,7 +22159,7 @@
         </p:nvSpPr>
         <p:spPr>
           <a:xfrm>
-            <a:off x="2519082" y="1905000"/>
+            <a:off x="2519080" y="1676288"/>
             <a:ext cx="8534400" cy="2246769"/>
           </a:xfrm>
           <a:prstGeom prst="rect">
@@ -22445,7 +22295,7 @@
         </p:nvSpPr>
         <p:spPr>
           <a:xfrm>
-            <a:off x="2519081" y="3172462"/>
+            <a:off x="2519080" y="2802398"/>
             <a:ext cx="5981351" cy="1600438"/>
           </a:xfrm>
           <a:prstGeom prst="rect">
@@ -22559,7 +22409,7 @@
         </p:nvSpPr>
         <p:spPr>
           <a:xfrm>
-            <a:off x="2519080" y="4772900"/>
+            <a:off x="2519080" y="5300234"/>
             <a:ext cx="5727296" cy="984885"/>
           </a:xfrm>
           <a:prstGeom prst="rect">
@@ -22668,6 +22518,113 @@
           <a:p>
             <a:pPr algn="ctr"/>
             <a:endParaRPr lang="ca-ES"/>
+          </a:p>
+        </p:txBody>
+      </p:sp>
+      <p:sp>
+        <p:nvSpPr>
+          <p:cNvPr id="8" name="CuadroTexto 7">
+            <a:extLst>
+              <a:ext uri="{FF2B5EF4-FFF2-40B4-BE49-F238E27FC236}">
+                <a16:creationId xmlns:a16="http://schemas.microsoft.com/office/drawing/2014/main" id="{CA0697B1-7F6F-4C4D-A3DA-9D7B36BEF47A}"/>
+              </a:ext>
+            </a:extLst>
+          </p:cNvPr>
+          <p:cNvSpPr txBox="1"/>
+          <p:nvPr/>
+        </p:nvSpPr>
+        <p:spPr>
+          <a:xfrm>
+            <a:off x="2519080" y="4218776"/>
+            <a:ext cx="5727296" cy="1292662"/>
+          </a:xfrm>
+          <a:prstGeom prst="rect">
+            <a:avLst/>
+          </a:prstGeom>
+          <a:noFill/>
+        </p:spPr>
+        <p:txBody>
+          <a:bodyPr wrap="square" rtlCol="0">
+            <a:spAutoFit/>
+          </a:bodyPr>
+          <a:lstStyle/>
+          <a:p>
+            <a:pPr marL="285750" indent="-285750">
+              <a:buFont typeface="Arial" panose="020B0604020202020204" pitchFamily="34" charset="0"/>
+              <a:buChar char="•"/>
+            </a:pPr>
+            <a:r>
+              <a:rPr lang="ca-ES" sz="2000" dirty="0">
+                <a:latin typeface="Arial" panose="020B0604020202020204" pitchFamily="34" charset="0"/>
+                <a:cs typeface="Arial" panose="020B0604020202020204" pitchFamily="34" charset="0"/>
+              </a:rPr>
+              <a:t>Optimitzar:</a:t>
+            </a:r>
+          </a:p>
+          <a:p>
+            <a:pPr marL="800100" lvl="1" indent="-342900">
+              <a:buFont typeface="Arial" panose="020B0604020202020204" pitchFamily="34" charset="0"/>
+              <a:buChar char="•"/>
+            </a:pPr>
+            <a:r>
+              <a:rPr lang="ca-ES" sz="2000" i="1" dirty="0" err="1">
+                <a:latin typeface="Arial" panose="020B0604020202020204" pitchFamily="34" charset="0"/>
+                <a:cs typeface="Arial" panose="020B0604020202020204" pitchFamily="34" charset="0"/>
+              </a:rPr>
+              <a:t>Grid</a:t>
+            </a:r>
+            <a:r>
+              <a:rPr lang="ca-ES" sz="2000" i="1" dirty="0">
+                <a:latin typeface="Arial" panose="020B0604020202020204" pitchFamily="34" charset="0"/>
+                <a:cs typeface="Arial" panose="020B0604020202020204" pitchFamily="34" charset="0"/>
+              </a:rPr>
+              <a:t> </a:t>
+            </a:r>
+            <a:r>
+              <a:rPr lang="ca-ES" sz="2000" i="1" dirty="0" err="1">
+                <a:latin typeface="Arial" panose="020B0604020202020204" pitchFamily="34" charset="0"/>
+                <a:cs typeface="Arial" panose="020B0604020202020204" pitchFamily="34" charset="0"/>
+              </a:rPr>
+              <a:t>SearchCV</a:t>
+            </a:r>
+            <a:endParaRPr lang="ca-ES" sz="2000" i="1" dirty="0">
+              <a:latin typeface="Arial" panose="020B0604020202020204" pitchFamily="34" charset="0"/>
+              <a:cs typeface="Arial" panose="020B0604020202020204" pitchFamily="34" charset="0"/>
+            </a:endParaRPr>
+          </a:p>
+          <a:p>
+            <a:pPr marL="800100" lvl="1" indent="-342900">
+              <a:buFont typeface="Arial" panose="020B0604020202020204" pitchFamily="34" charset="0"/>
+              <a:buChar char="•"/>
+            </a:pPr>
+            <a:r>
+              <a:rPr lang="ca-ES" sz="2000" i="1" dirty="0" err="1">
+                <a:latin typeface="Arial" panose="020B0604020202020204" pitchFamily="34" charset="0"/>
+                <a:cs typeface="Arial" panose="020B0604020202020204" pitchFamily="34" charset="0"/>
+              </a:rPr>
+              <a:t>Randomized</a:t>
+            </a:r>
+            <a:r>
+              <a:rPr lang="ca-ES" sz="2000" i="1" dirty="0">
+                <a:latin typeface="Arial" panose="020B0604020202020204" pitchFamily="34" charset="0"/>
+                <a:cs typeface="Arial" panose="020B0604020202020204" pitchFamily="34" charset="0"/>
+              </a:rPr>
+              <a:t> </a:t>
+            </a:r>
+            <a:r>
+              <a:rPr lang="ca-ES" sz="2000" i="1" dirty="0" err="1">
+                <a:latin typeface="Arial" panose="020B0604020202020204" pitchFamily="34" charset="0"/>
+                <a:cs typeface="Arial" panose="020B0604020202020204" pitchFamily="34" charset="0"/>
+              </a:rPr>
+              <a:t>SearchCV</a:t>
+            </a:r>
+            <a:endParaRPr lang="ca-ES" sz="2000" i="1" dirty="0">
+              <a:latin typeface="Arial" panose="020B0604020202020204" pitchFamily="34" charset="0"/>
+              <a:cs typeface="Arial" panose="020B0604020202020204" pitchFamily="34" charset="0"/>
+            </a:endParaRPr>
+          </a:p>
+          <a:p>
+            <a:endParaRPr lang="ca-ES" dirty="0"/>
           </a:p>
         </p:txBody>
       </p:sp>
@@ -22787,6 +22744,51 @@
                                           </p:stCondLst>
                                         </p:cTn>
                                         <p:tgtEl>
+                                          <p:spTgt spid="8"/>
+                                        </p:tgtEl>
+                                        <p:attrNameLst>
+                                          <p:attrName>style.visibility</p:attrName>
+                                        </p:attrNameLst>
+                                      </p:cBhvr>
+                                      <p:to>
+                                        <p:strVal val="visible"/>
+                                      </p:to>
+                                    </p:set>
+                                  </p:childTnLst>
+                                </p:cTn>
+                              </p:par>
+                            </p:childTnLst>
+                          </p:cTn>
+                        </p:par>
+                      </p:childTnLst>
+                    </p:cTn>
+                  </p:par>
+                  <p:par>
+                    <p:cTn id="13" fill="hold">
+                      <p:stCondLst>
+                        <p:cond delay="indefinite"/>
+                      </p:stCondLst>
+                      <p:childTnLst>
+                        <p:par>
+                          <p:cTn id="14" fill="hold">
+                            <p:stCondLst>
+                              <p:cond delay="0"/>
+                            </p:stCondLst>
+                            <p:childTnLst>
+                              <p:par>
+                                <p:cTn id="15" presetID="1" presetClass="entr" presetSubtype="0" fill="hold" grpId="0" nodeType="clickEffect">
+                                  <p:stCondLst>
+                                    <p:cond delay="0"/>
+                                  </p:stCondLst>
+                                  <p:childTnLst>
+                                    <p:set>
+                                      <p:cBhvr>
+                                        <p:cTn id="16" dur="1" fill="hold">
+                                          <p:stCondLst>
+                                            <p:cond delay="0"/>
+                                          </p:stCondLst>
+                                        </p:cTn>
+                                        <p:tgtEl>
                                           <p:spTgt spid="6"/>
                                         </p:tgtEl>
                                         <p:attrNameLst>
@@ -22831,6 +22833,7 @@
       <p:bldP spid="4" grpId="0"/>
       <p:bldP spid="6" grpId="0"/>
       <p:bldP spid="7" grpId="0" animBg="1"/>
+      <p:bldP spid="8" grpId="0"/>
     </p:bldLst>
   </p:timing>
 </p:sld>

</xml_diff>